<commit_message>
Update ICEG ppt for SEMIC
</commit_message>
<xml_diff>
--- a/Meetings/2024-06-12/20240627-ICEG voor SEMIC.pptx
+++ b/Meetings/2024-06-12/20240627-ICEG voor SEMIC.pptx
@@ -152,17 +152,25 @@
 </p:cmAuthorLst>
 </file>
 
+<file path=ppt/revisionInfo.xml><?xml version="1.0" encoding="utf-8"?>
+<p1510:revInfo xmlns:a="http://schemas.openxmlformats.org/drawingml/2006/main" xmlns:r="http://schemas.openxmlformats.org/officeDocument/2006/relationships" xmlns:p1510="http://schemas.microsoft.com/office/powerpoint/2015/10/main">
+  <p1510:revLst>
+    <p1510:client id="{19946E19-6A71-41FF-BE86-9B534CEBBFC3}" v="20" dt="2024-06-12T09:29:37.245"/>
+  </p1510:revLst>
+</p1510:revInfo>
+</file>
+
 <file path=ppt/changesInfos/changesInfo1.xml><?xml version="1.0" encoding="utf-8"?>
 <pc:chgInfo xmlns:a="http://schemas.openxmlformats.org/drawingml/2006/main" xmlns:r="http://schemas.openxmlformats.org/officeDocument/2006/relationships" xmlns:ac="http://schemas.microsoft.com/office/drawing/2013/main/command" xmlns:pc="http://schemas.microsoft.com/office/powerpoint/2013/main/command">
   <pc:docChgLst>
     <pc:chgData name="Marc Bruyland (BOSA)" userId="30f554ab-b4b0-445e-a2ab-9dd766d4dafd" providerId="ADAL" clId="{19946E19-6A71-41FF-BE86-9B534CEBBFC3}"/>
-    <pc:docChg chg="modSld">
-      <pc:chgData name="Marc Bruyland (BOSA)" userId="30f554ab-b4b0-445e-a2ab-9dd766d4dafd" providerId="ADAL" clId="{19946E19-6A71-41FF-BE86-9B534CEBBFC3}" dt="2024-06-07T09:25:08.685" v="6" actId="115"/>
+    <pc:docChg chg="custSel modSld">
+      <pc:chgData name="Marc Bruyland (BOSA)" userId="30f554ab-b4b0-445e-a2ab-9dd766d4dafd" providerId="ADAL" clId="{19946E19-6A71-41FF-BE86-9B534CEBBFC3}" dt="2024-06-12T09:29:37.245" v="56"/>
       <pc:docMkLst>
         <pc:docMk/>
       </pc:docMkLst>
-      <pc:sldChg chg="modSp mod">
-        <pc:chgData name="Marc Bruyland (BOSA)" userId="30f554ab-b4b0-445e-a2ab-9dd766d4dafd" providerId="ADAL" clId="{19946E19-6A71-41FF-BE86-9B534CEBBFC3}" dt="2024-06-07T09:25:08.685" v="6" actId="115"/>
+      <pc:sldChg chg="addSp delSp modSp mod">
+        <pc:chgData name="Marc Bruyland (BOSA)" userId="30f554ab-b4b0-445e-a2ab-9dd766d4dafd" providerId="ADAL" clId="{19946E19-6A71-41FF-BE86-9B534CEBBFC3}" dt="2024-06-12T09:27:47.233" v="28" actId="1076"/>
         <pc:sldMkLst>
           <pc:docMk/>
           <pc:sldMk cId="2215070891" sldId="256"/>
@@ -175,6 +183,299 @@
             <ac:spMk id="2" creationId="{BF6339DF-A1E3-4BC4-97F4-7D5A81A61BCF}"/>
           </ac:spMkLst>
         </pc:spChg>
+        <pc:spChg chg="del mod">
+          <ac:chgData name="Marc Bruyland (BOSA)" userId="30f554ab-b4b0-445e-a2ab-9dd766d4dafd" providerId="ADAL" clId="{19946E19-6A71-41FF-BE86-9B534CEBBFC3}" dt="2024-06-12T09:24:59.159" v="11" actId="478"/>
+          <ac:spMkLst>
+            <pc:docMk/>
+            <pc:sldMk cId="2215070891" sldId="256"/>
+            <ac:spMk id="7" creationId="{10F3F713-92CB-3AFA-05FD-F8C3BBD9C5B5}"/>
+          </ac:spMkLst>
+        </pc:spChg>
+        <pc:picChg chg="add mod">
+          <ac:chgData name="Marc Bruyland (BOSA)" userId="30f554ab-b4b0-445e-a2ab-9dd766d4dafd" providerId="ADAL" clId="{19946E19-6A71-41FF-BE86-9B534CEBBFC3}" dt="2024-06-12T09:25:02.921" v="12" actId="1076"/>
+          <ac:picMkLst>
+            <pc:docMk/>
+            <pc:sldMk cId="2215070891" sldId="256"/>
+            <ac:picMk id="5" creationId="{1C567413-0BFA-1F83-8D65-76BABCC2EFF4}"/>
+          </ac:picMkLst>
+        </pc:picChg>
+        <pc:picChg chg="add mod">
+          <ac:chgData name="Marc Bruyland (BOSA)" userId="30f554ab-b4b0-445e-a2ab-9dd766d4dafd" providerId="ADAL" clId="{19946E19-6A71-41FF-BE86-9B534CEBBFC3}" dt="2024-06-12T09:27:47.233" v="28" actId="1076"/>
+          <ac:picMkLst>
+            <pc:docMk/>
+            <pc:sldMk cId="2215070891" sldId="256"/>
+            <ac:picMk id="8" creationId="{344D008E-7356-873A-BC3E-09BC90D10B3F}"/>
+          </ac:picMkLst>
+        </pc:picChg>
+      </pc:sldChg>
+      <pc:sldChg chg="addSp modSp mod">
+        <pc:chgData name="Marc Bruyland (BOSA)" userId="30f554ab-b4b0-445e-a2ab-9dd766d4dafd" providerId="ADAL" clId="{19946E19-6A71-41FF-BE86-9B534CEBBFC3}" dt="2024-06-12T09:27:59.763" v="30" actId="1076"/>
+        <pc:sldMkLst>
+          <pc:docMk/>
+          <pc:sldMk cId="887695320" sldId="257"/>
+        </pc:sldMkLst>
+        <pc:picChg chg="add mod">
+          <ac:chgData name="Marc Bruyland (BOSA)" userId="30f554ab-b4b0-445e-a2ab-9dd766d4dafd" providerId="ADAL" clId="{19946E19-6A71-41FF-BE86-9B534CEBBFC3}" dt="2024-06-12T09:26:28.176" v="26"/>
+          <ac:picMkLst>
+            <pc:docMk/>
+            <pc:sldMk cId="887695320" sldId="257"/>
+            <ac:picMk id="3" creationId="{F5650E4A-A455-044E-A804-EA64326CFE1A}"/>
+          </ac:picMkLst>
+        </pc:picChg>
+        <pc:picChg chg="add mod">
+          <ac:chgData name="Marc Bruyland (BOSA)" userId="30f554ab-b4b0-445e-a2ab-9dd766d4dafd" providerId="ADAL" clId="{19946E19-6A71-41FF-BE86-9B534CEBBFC3}" dt="2024-06-12T09:27:59.763" v="30" actId="1076"/>
+          <ac:picMkLst>
+            <pc:docMk/>
+            <pc:sldMk cId="887695320" sldId="257"/>
+            <ac:picMk id="5" creationId="{B4138F83-95DD-551E-11E7-F22CD205110E}"/>
+          </ac:picMkLst>
+        </pc:picChg>
+      </pc:sldChg>
+      <pc:sldChg chg="addSp delSp modSp mod">
+        <pc:chgData name="Marc Bruyland (BOSA)" userId="30f554ab-b4b0-445e-a2ab-9dd766d4dafd" providerId="ADAL" clId="{19946E19-6A71-41FF-BE86-9B534CEBBFC3}" dt="2024-06-12T09:28:50.465" v="40" actId="1076"/>
+        <pc:sldMkLst>
+          <pc:docMk/>
+          <pc:sldMk cId="3491986848" sldId="261"/>
+        </pc:sldMkLst>
+        <pc:picChg chg="add del mod">
+          <ac:chgData name="Marc Bruyland (BOSA)" userId="30f554ab-b4b0-445e-a2ab-9dd766d4dafd" providerId="ADAL" clId="{19946E19-6A71-41FF-BE86-9B534CEBBFC3}" dt="2024-06-12T09:28:47.159" v="38" actId="478"/>
+          <ac:picMkLst>
+            <pc:docMk/>
+            <pc:sldMk cId="3491986848" sldId="261"/>
+            <ac:picMk id="4" creationId="{9CE351C4-B470-F02A-61CF-C89E8FEB04AF}"/>
+          </ac:picMkLst>
+        </pc:picChg>
+        <pc:picChg chg="add del mod">
+          <ac:chgData name="Marc Bruyland (BOSA)" userId="30f554ab-b4b0-445e-a2ab-9dd766d4dafd" providerId="ADAL" clId="{19946E19-6A71-41FF-BE86-9B534CEBBFC3}" dt="2024-06-12T09:28:47.859" v="39" actId="478"/>
+          <ac:picMkLst>
+            <pc:docMk/>
+            <pc:sldMk cId="3491986848" sldId="261"/>
+            <ac:picMk id="6" creationId="{93FCB71E-F366-3371-2368-1D7517152D1E}"/>
+          </ac:picMkLst>
+        </pc:picChg>
+        <pc:picChg chg="add mod">
+          <ac:chgData name="Marc Bruyland (BOSA)" userId="30f554ab-b4b0-445e-a2ab-9dd766d4dafd" providerId="ADAL" clId="{19946E19-6A71-41FF-BE86-9B534CEBBFC3}" dt="2024-06-12T09:28:50.465" v="40" actId="1076"/>
+          <ac:picMkLst>
+            <pc:docMk/>
+            <pc:sldMk cId="3491986848" sldId="261"/>
+            <ac:picMk id="7" creationId="{C97C7AD8-47A1-1CC7-34A8-D440132227B3}"/>
+          </ac:picMkLst>
+        </pc:picChg>
+      </pc:sldChg>
+      <pc:sldChg chg="addSp delSp modSp mod">
+        <pc:chgData name="Marc Bruyland (BOSA)" userId="30f554ab-b4b0-445e-a2ab-9dd766d4dafd" providerId="ADAL" clId="{19946E19-6A71-41FF-BE86-9B534CEBBFC3}" dt="2024-06-12T09:28:58.791" v="42"/>
+        <pc:sldMkLst>
+          <pc:docMk/>
+          <pc:sldMk cId="4112743041" sldId="262"/>
+        </pc:sldMkLst>
+        <pc:picChg chg="add del mod">
+          <ac:chgData name="Marc Bruyland (BOSA)" userId="30f554ab-b4b0-445e-a2ab-9dd766d4dafd" providerId="ADAL" clId="{19946E19-6A71-41FF-BE86-9B534CEBBFC3}" dt="2024-06-12T09:28:57.331" v="41" actId="478"/>
+          <ac:picMkLst>
+            <pc:docMk/>
+            <pc:sldMk cId="4112743041" sldId="262"/>
+            <ac:picMk id="3" creationId="{65BDFDD4-4D61-78D6-D42D-668360D2EA81}"/>
+          </ac:picMkLst>
+        </pc:picChg>
+        <pc:picChg chg="add mod">
+          <ac:chgData name="Marc Bruyland (BOSA)" userId="30f554ab-b4b0-445e-a2ab-9dd766d4dafd" providerId="ADAL" clId="{19946E19-6A71-41FF-BE86-9B534CEBBFC3}" dt="2024-06-12T09:28:58.791" v="42"/>
+          <ac:picMkLst>
+            <pc:docMk/>
+            <pc:sldMk cId="4112743041" sldId="262"/>
+            <ac:picMk id="5" creationId="{5E4B2CB4-72DD-ECB7-409E-45D8E996ECD4}"/>
+          </ac:picMkLst>
+        </pc:picChg>
+      </pc:sldChg>
+      <pc:sldChg chg="addSp delSp modSp mod">
+        <pc:chgData name="Marc Bruyland (BOSA)" userId="30f554ab-b4b0-445e-a2ab-9dd766d4dafd" providerId="ADAL" clId="{19946E19-6A71-41FF-BE86-9B534CEBBFC3}" dt="2024-06-12T09:29:09.851" v="46"/>
+        <pc:sldMkLst>
+          <pc:docMk/>
+          <pc:sldMk cId="1497996610" sldId="263"/>
+        </pc:sldMkLst>
+        <pc:picChg chg="add del mod">
+          <ac:chgData name="Marc Bruyland (BOSA)" userId="30f554ab-b4b0-445e-a2ab-9dd766d4dafd" providerId="ADAL" clId="{19946E19-6A71-41FF-BE86-9B534CEBBFC3}" dt="2024-06-12T09:29:08.535" v="45" actId="478"/>
+          <ac:picMkLst>
+            <pc:docMk/>
+            <pc:sldMk cId="1497996610" sldId="263"/>
+            <ac:picMk id="4" creationId="{F3AC8547-45D8-C9FD-CB6E-61E3A247660F}"/>
+          </ac:picMkLst>
+        </pc:picChg>
+        <pc:picChg chg="add mod">
+          <ac:chgData name="Marc Bruyland (BOSA)" userId="30f554ab-b4b0-445e-a2ab-9dd766d4dafd" providerId="ADAL" clId="{19946E19-6A71-41FF-BE86-9B534CEBBFC3}" dt="2024-06-12T09:29:09.851" v="46"/>
+          <ac:picMkLst>
+            <pc:docMk/>
+            <pc:sldMk cId="1497996610" sldId="263"/>
+            <ac:picMk id="6" creationId="{11AA81B8-C305-26D4-B264-BF17F9BC5C6F}"/>
+          </ac:picMkLst>
+        </pc:picChg>
+      </pc:sldChg>
+      <pc:sldChg chg="addSp delSp modSp mod">
+        <pc:chgData name="Marc Bruyland (BOSA)" userId="30f554ab-b4b0-445e-a2ab-9dd766d4dafd" providerId="ADAL" clId="{19946E19-6A71-41FF-BE86-9B534CEBBFC3}" dt="2024-06-12T09:29:13.678" v="48"/>
+        <pc:sldMkLst>
+          <pc:docMk/>
+          <pc:sldMk cId="3800073711" sldId="264"/>
+        </pc:sldMkLst>
+        <pc:picChg chg="add del mod">
+          <ac:chgData name="Marc Bruyland (BOSA)" userId="30f554ab-b4b0-445e-a2ab-9dd766d4dafd" providerId="ADAL" clId="{19946E19-6A71-41FF-BE86-9B534CEBBFC3}" dt="2024-06-12T09:29:12.485" v="47" actId="478"/>
+          <ac:picMkLst>
+            <pc:docMk/>
+            <pc:sldMk cId="3800073711" sldId="264"/>
+            <ac:picMk id="4" creationId="{386AF5EC-F646-11EF-2A08-B680CA499C45}"/>
+          </ac:picMkLst>
+        </pc:picChg>
+        <pc:picChg chg="add mod">
+          <ac:chgData name="Marc Bruyland (BOSA)" userId="30f554ab-b4b0-445e-a2ab-9dd766d4dafd" providerId="ADAL" clId="{19946E19-6A71-41FF-BE86-9B534CEBBFC3}" dt="2024-06-12T09:29:13.678" v="48"/>
+          <ac:picMkLst>
+            <pc:docMk/>
+            <pc:sldMk cId="3800073711" sldId="264"/>
+            <ac:picMk id="5" creationId="{382A70AB-5C8E-EF1A-FDD0-99E9C0CBC829}"/>
+          </ac:picMkLst>
+        </pc:picChg>
+      </pc:sldChg>
+      <pc:sldChg chg="addSp delSp modSp mod">
+        <pc:chgData name="Marc Bruyland (BOSA)" userId="30f554ab-b4b0-445e-a2ab-9dd766d4dafd" providerId="ADAL" clId="{19946E19-6A71-41FF-BE86-9B534CEBBFC3}" dt="2024-06-12T09:29:19.918" v="50"/>
+        <pc:sldMkLst>
+          <pc:docMk/>
+          <pc:sldMk cId="2946174427" sldId="265"/>
+        </pc:sldMkLst>
+        <pc:picChg chg="add del mod">
+          <ac:chgData name="Marc Bruyland (BOSA)" userId="30f554ab-b4b0-445e-a2ab-9dd766d4dafd" providerId="ADAL" clId="{19946E19-6A71-41FF-BE86-9B534CEBBFC3}" dt="2024-06-12T09:29:19.294" v="49" actId="478"/>
+          <ac:picMkLst>
+            <pc:docMk/>
+            <pc:sldMk cId="2946174427" sldId="265"/>
+            <ac:picMk id="4" creationId="{16B824BA-1919-16F9-B1C7-BDA3DFE69827}"/>
+          </ac:picMkLst>
+        </pc:picChg>
+        <pc:picChg chg="add mod">
+          <ac:chgData name="Marc Bruyland (BOSA)" userId="30f554ab-b4b0-445e-a2ab-9dd766d4dafd" providerId="ADAL" clId="{19946E19-6A71-41FF-BE86-9B534CEBBFC3}" dt="2024-06-12T09:29:19.918" v="50"/>
+          <ac:picMkLst>
+            <pc:docMk/>
+            <pc:sldMk cId="2946174427" sldId="265"/>
+            <ac:picMk id="5" creationId="{E6EED494-061B-D239-7940-CB0E92996F31}"/>
+          </ac:picMkLst>
+        </pc:picChg>
+      </pc:sldChg>
+      <pc:sldChg chg="addSp delSp modSp mod">
+        <pc:chgData name="Marc Bruyland (BOSA)" userId="30f554ab-b4b0-445e-a2ab-9dd766d4dafd" providerId="ADAL" clId="{19946E19-6A71-41FF-BE86-9B534CEBBFC3}" dt="2024-06-12T09:29:04.889" v="44"/>
+        <pc:sldMkLst>
+          <pc:docMk/>
+          <pc:sldMk cId="2428785735" sldId="266"/>
+        </pc:sldMkLst>
+        <pc:spChg chg="mod">
+          <ac:chgData name="Marc Bruyland (BOSA)" userId="30f554ab-b4b0-445e-a2ab-9dd766d4dafd" providerId="ADAL" clId="{19946E19-6A71-41FF-BE86-9B534CEBBFC3}" dt="2024-06-12T07:59:51.981" v="8" actId="20577"/>
+          <ac:spMkLst>
+            <pc:docMk/>
+            <pc:sldMk cId="2428785735" sldId="266"/>
+            <ac:spMk id="4" creationId="{7C8C40FC-904C-41F9-9547-5F99BBAEEE9B}"/>
+          </ac:spMkLst>
+        </pc:spChg>
+        <pc:picChg chg="add del mod">
+          <ac:chgData name="Marc Bruyland (BOSA)" userId="30f554ab-b4b0-445e-a2ab-9dd766d4dafd" providerId="ADAL" clId="{19946E19-6A71-41FF-BE86-9B534CEBBFC3}" dt="2024-06-12T09:29:03.525" v="43" actId="478"/>
+          <ac:picMkLst>
+            <pc:docMk/>
+            <pc:sldMk cId="2428785735" sldId="266"/>
+            <ac:picMk id="3" creationId="{D9B81167-6CFF-7EC7-6812-2CC67A0177F8}"/>
+          </ac:picMkLst>
+        </pc:picChg>
+        <pc:picChg chg="mod">
+          <ac:chgData name="Marc Bruyland (BOSA)" userId="30f554ab-b4b0-445e-a2ab-9dd766d4dafd" providerId="ADAL" clId="{19946E19-6A71-41FF-BE86-9B534CEBBFC3}" dt="2024-06-12T09:25:41.526" v="18" actId="14100"/>
+          <ac:picMkLst>
+            <pc:docMk/>
+            <pc:sldMk cId="2428785735" sldId="266"/>
+            <ac:picMk id="5" creationId="{3DB1B38B-57E7-4A7B-AF2B-D38BEA1E6B5B}"/>
+          </ac:picMkLst>
+        </pc:picChg>
+        <pc:picChg chg="add mod">
+          <ac:chgData name="Marc Bruyland (BOSA)" userId="30f554ab-b4b0-445e-a2ab-9dd766d4dafd" providerId="ADAL" clId="{19946E19-6A71-41FF-BE86-9B534CEBBFC3}" dt="2024-06-12T09:29:04.889" v="44"/>
+          <ac:picMkLst>
+            <pc:docMk/>
+            <pc:sldMk cId="2428785735" sldId="266"/>
+            <ac:picMk id="7" creationId="{47E2B5A2-32AA-B23C-D66D-63173A95AF56}"/>
+          </ac:picMkLst>
+        </pc:picChg>
+      </pc:sldChg>
+      <pc:sldChg chg="addSp delSp modSp mod">
+        <pc:chgData name="Marc Bruyland (BOSA)" userId="30f554ab-b4b0-445e-a2ab-9dd766d4dafd" providerId="ADAL" clId="{19946E19-6A71-41FF-BE86-9B534CEBBFC3}" dt="2024-06-12T09:29:25.651" v="52"/>
+        <pc:sldMkLst>
+          <pc:docMk/>
+          <pc:sldMk cId="3780155913" sldId="267"/>
+        </pc:sldMkLst>
+        <pc:picChg chg="add del mod">
+          <ac:chgData name="Marc Bruyland (BOSA)" userId="30f554ab-b4b0-445e-a2ab-9dd766d4dafd" providerId="ADAL" clId="{19946E19-6A71-41FF-BE86-9B534CEBBFC3}" dt="2024-06-12T09:29:24.546" v="51" actId="478"/>
+          <ac:picMkLst>
+            <pc:docMk/>
+            <pc:sldMk cId="3780155913" sldId="267"/>
+            <ac:picMk id="6" creationId="{80B7E18D-DE88-8050-CB3D-0F7A9D2C1D53}"/>
+          </ac:picMkLst>
+        </pc:picChg>
+        <pc:picChg chg="add mod">
+          <ac:chgData name="Marc Bruyland (BOSA)" userId="30f554ab-b4b0-445e-a2ab-9dd766d4dafd" providerId="ADAL" clId="{19946E19-6A71-41FF-BE86-9B534CEBBFC3}" dt="2024-06-12T09:29:25.651" v="52"/>
+          <ac:picMkLst>
+            <pc:docMk/>
+            <pc:sldMk cId="3780155913" sldId="267"/>
+            <ac:picMk id="7" creationId="{AF721B13-6745-9D91-A98B-04115A811ED5}"/>
+          </ac:picMkLst>
+        </pc:picChg>
+      </pc:sldChg>
+      <pc:sldChg chg="addSp delSp modSp mod">
+        <pc:chgData name="Marc Bruyland (BOSA)" userId="30f554ab-b4b0-445e-a2ab-9dd766d4dafd" providerId="ADAL" clId="{19946E19-6A71-41FF-BE86-9B534CEBBFC3}" dt="2024-06-12T09:29:32.546" v="54"/>
+        <pc:sldMkLst>
+          <pc:docMk/>
+          <pc:sldMk cId="1438930030" sldId="268"/>
+        </pc:sldMkLst>
+        <pc:picChg chg="add del mod">
+          <ac:chgData name="Marc Bruyland (BOSA)" userId="30f554ab-b4b0-445e-a2ab-9dd766d4dafd" providerId="ADAL" clId="{19946E19-6A71-41FF-BE86-9B534CEBBFC3}" dt="2024-06-12T09:29:31.606" v="53" actId="478"/>
+          <ac:picMkLst>
+            <pc:docMk/>
+            <pc:sldMk cId="1438930030" sldId="268"/>
+            <ac:picMk id="4" creationId="{4402B610-0429-DF48-7611-2A25096C0193}"/>
+          </ac:picMkLst>
+        </pc:picChg>
+        <pc:picChg chg="add mod">
+          <ac:chgData name="Marc Bruyland (BOSA)" userId="30f554ab-b4b0-445e-a2ab-9dd766d4dafd" providerId="ADAL" clId="{19946E19-6A71-41FF-BE86-9B534CEBBFC3}" dt="2024-06-12T09:29:32.546" v="54"/>
+          <ac:picMkLst>
+            <pc:docMk/>
+            <pc:sldMk cId="1438930030" sldId="268"/>
+            <ac:picMk id="7" creationId="{C853B490-EB77-E487-B100-6B9661BD46B9}"/>
+          </ac:picMkLst>
+        </pc:picChg>
+      </pc:sldChg>
+      <pc:sldChg chg="addSp delSp modSp mod">
+        <pc:chgData name="Marc Bruyland (BOSA)" userId="30f554ab-b4b0-445e-a2ab-9dd766d4dafd" providerId="ADAL" clId="{19946E19-6A71-41FF-BE86-9B534CEBBFC3}" dt="2024-06-12T09:29:37.245" v="56"/>
+        <pc:sldMkLst>
+          <pc:docMk/>
+          <pc:sldMk cId="2010060151" sldId="269"/>
+        </pc:sldMkLst>
+        <pc:picChg chg="add del mod">
+          <ac:chgData name="Marc Bruyland (BOSA)" userId="30f554ab-b4b0-445e-a2ab-9dd766d4dafd" providerId="ADAL" clId="{19946E19-6A71-41FF-BE86-9B534CEBBFC3}" dt="2024-06-12T09:29:35.941" v="55" actId="478"/>
+          <ac:picMkLst>
+            <pc:docMk/>
+            <pc:sldMk cId="2010060151" sldId="269"/>
+            <ac:picMk id="3" creationId="{1BEB2566-6342-B36A-96A0-0C42C9A90844}"/>
+          </ac:picMkLst>
+        </pc:picChg>
+        <pc:picChg chg="add mod">
+          <ac:chgData name="Marc Bruyland (BOSA)" userId="30f554ab-b4b0-445e-a2ab-9dd766d4dafd" providerId="ADAL" clId="{19946E19-6A71-41FF-BE86-9B534CEBBFC3}" dt="2024-06-12T09:29:37.245" v="56"/>
+          <ac:picMkLst>
+            <pc:docMk/>
+            <pc:sldMk cId="2010060151" sldId="269"/>
+            <ac:picMk id="4" creationId="{9F6A1422-A8C0-F931-10EF-03D6C9C8AE25}"/>
+          </ac:picMkLst>
+        </pc:picChg>
+      </pc:sldChg>
+      <pc:sldChg chg="addSp modSp">
+        <pc:chgData name="Marc Bruyland (BOSA)" userId="30f554ab-b4b0-445e-a2ab-9dd766d4dafd" providerId="ADAL" clId="{19946E19-6A71-41FF-BE86-9B534CEBBFC3}" dt="2024-06-12T09:26:18.891" v="25"/>
+        <pc:sldMkLst>
+          <pc:docMk/>
+          <pc:sldMk cId="2159457380" sldId="270"/>
+        </pc:sldMkLst>
+        <pc:picChg chg="add mod">
+          <ac:chgData name="Marc Bruyland (BOSA)" userId="30f554ab-b4b0-445e-a2ab-9dd766d4dafd" providerId="ADAL" clId="{19946E19-6A71-41FF-BE86-9B534CEBBFC3}" dt="2024-06-12T09:26:18.891" v="25"/>
+          <ac:picMkLst>
+            <pc:docMk/>
+            <pc:sldMk cId="2159457380" sldId="270"/>
+            <ac:picMk id="3" creationId="{F324C7D4-3148-CFCB-D6DF-F85A3FC1382D}"/>
+          </ac:picMkLst>
+        </pc:picChg>
       </pc:sldChg>
     </pc:docChg>
   </pc:docChgLst>
@@ -4350,7 +4651,7 @@
           <a:p>
             <a:fld id="{10725DA4-A8DC-453E-A5F7-88F0AE5319D4}" type="datetimeFigureOut">
               <a:rPr lang="nl-BE" smtClean="0"/>
-              <a:t>7/06/2024</a:t>
+              <a:t>12/06/2024</a:t>
             </a:fld>
             <a:endParaRPr lang="nl-BE"/>
           </a:p>
@@ -4527,7 +4828,7 @@
           <a:p>
             <a:fld id="{D9A92508-5353-4BD4-B9CC-1DB34B125BDB}" type="datetimeFigureOut">
               <a:rPr lang="nl-BE" smtClean="0"/>
-              <a:t>7/06/2024</a:t>
+              <a:t>12/06/2024</a:t>
             </a:fld>
             <a:endParaRPr lang="nl-BE"/>
           </a:p>
@@ -11334,7 +11635,7 @@
             <a:fld id="{AE753531-74F9-46DB-8226-2C37E7D3FBBB}" type="datetime3">
               <a:rPr lang="nl-BE" smtClean="0"/>
               <a:pPr/>
-              <a:t>7.06.24</a:t>
+              <a:t>12.06.24</a:t>
             </a:fld>
             <a:endParaRPr lang="nl-BE"/>
           </a:p>
@@ -12051,7 +12352,7 @@
                 <a:tabLst/>
                 <a:defRPr/>
               </a:pPr>
-              <a:t>7.06.24</a:t>
+              <a:t>12.06.24</a:t>
             </a:fld>
             <a:endParaRPr kumimoji="0" lang="nl-BE" sz="1050" b="0" i="0" u="none" strike="noStrike" kern="1200" cap="none" spc="0" normalizeH="0" baseline="0" noProof="0">
               <a:ln>
@@ -12817,60 +13118,6 @@
           </a:p>
         </p:txBody>
       </p:sp>
-      <p:sp>
-        <p:nvSpPr>
-          <p:cNvPr id="7" name="Rectangle: Rounded Corners 6">
-            <a:extLst>
-              <a:ext uri="{FF2B5EF4-FFF2-40B4-BE49-F238E27FC236}">
-                <a16:creationId xmlns:a16="http://schemas.microsoft.com/office/drawing/2014/main" id="{10F3F713-92CB-3AFA-05FD-F8C3BBD9C5B5}"/>
-              </a:ext>
-            </a:extLst>
-          </p:cNvPr>
-          <p:cNvSpPr/>
-          <p:nvPr/>
-        </p:nvSpPr>
-        <p:spPr>
-          <a:xfrm>
-            <a:off x="123825" y="142875"/>
-            <a:ext cx="3200400" cy="979488"/>
-          </a:xfrm>
-          <a:prstGeom prst="roundRect">
-            <a:avLst/>
-          </a:prstGeom>
-          <a:solidFill>
-            <a:schemeClr val="tx1"/>
-          </a:solidFill>
-          <a:ln>
-            <a:solidFill>
-              <a:schemeClr val="tx1"/>
-            </a:solidFill>
-          </a:ln>
-        </p:spPr>
-        <p:style>
-          <a:lnRef idx="2">
-            <a:schemeClr val="accent1">
-              <a:shade val="15000"/>
-            </a:schemeClr>
-          </a:lnRef>
-          <a:fillRef idx="1">
-            <a:schemeClr val="accent1"/>
-          </a:fillRef>
-          <a:effectRef idx="0">
-            <a:schemeClr val="accent1"/>
-          </a:effectRef>
-          <a:fontRef idx="minor">
-            <a:schemeClr val="lt1"/>
-          </a:fontRef>
-        </p:style>
-        <p:txBody>
-          <a:bodyPr rtlCol="0" anchor="ctr"/>
-          <a:lstStyle/>
-          <a:p>
-            <a:pPr algn="ctr"/>
-            <a:endParaRPr lang="nl-BE"/>
-          </a:p>
-        </p:txBody>
-      </p:sp>
       <p:pic>
         <p:nvPicPr>
           <p:cNvPr id="4" name="Picture 3" descr="A group of blue and yellow logos&#10;&#10;Description automatically generated">
@@ -12901,6 +13148,66 @@
           <a:xfrm>
             <a:off x="2309253" y="5486400"/>
             <a:ext cx="9396132" cy="1228725"/>
+          </a:xfrm>
+          <a:prstGeom prst="rect">
+            <a:avLst/>
+          </a:prstGeom>
+        </p:spPr>
+      </p:pic>
+      <p:pic>
+        <p:nvPicPr>
+          <p:cNvPr id="5" name="Picture 4">
+            <a:extLst>
+              <a:ext uri="{FF2B5EF4-FFF2-40B4-BE49-F238E27FC236}">
+                <a16:creationId xmlns:a16="http://schemas.microsoft.com/office/drawing/2014/main" id="{1C567413-0BFA-1F83-8D65-76BABCC2EFF4}"/>
+              </a:ext>
+            </a:extLst>
+          </p:cNvPr>
+          <p:cNvPicPr>
+            <a:picLocks noChangeAspect="1"/>
+          </p:cNvPicPr>
+          <p:nvPr/>
+        </p:nvPicPr>
+        <p:blipFill>
+          <a:blip r:embed="rId3"/>
+          <a:stretch>
+            <a:fillRect/>
+          </a:stretch>
+        </p:blipFill>
+        <p:spPr>
+          <a:xfrm>
+            <a:off x="0" y="0"/>
+            <a:ext cx="3572374" cy="1895740"/>
+          </a:xfrm>
+          <a:prstGeom prst="rect">
+            <a:avLst/>
+          </a:prstGeom>
+        </p:spPr>
+      </p:pic>
+      <p:pic>
+        <p:nvPicPr>
+          <p:cNvPr id="8" name="Picture 7">
+            <a:extLst>
+              <a:ext uri="{FF2B5EF4-FFF2-40B4-BE49-F238E27FC236}">
+                <a16:creationId xmlns:a16="http://schemas.microsoft.com/office/drawing/2014/main" id="{344D008E-7356-873A-BC3E-09BC90D10B3F}"/>
+              </a:ext>
+            </a:extLst>
+          </p:cNvPr>
+          <p:cNvPicPr>
+            <a:picLocks noChangeAspect="1"/>
+          </p:cNvPicPr>
+          <p:nvPr/>
+        </p:nvPicPr>
+        <p:blipFill>
+          <a:blip r:embed="rId4"/>
+          <a:stretch>
+            <a:fillRect/>
+          </a:stretch>
+        </p:blipFill>
+        <p:spPr>
+          <a:xfrm>
+            <a:off x="9591312" y="0"/>
+            <a:ext cx="2600688" cy="1038370"/>
           </a:xfrm>
           <a:prstGeom prst="rect">
             <a:avLst/>
@@ -14790,6 +15097,36 @@
           </a:p>
         </p:txBody>
       </p:sp>
+      <p:pic>
+        <p:nvPicPr>
+          <p:cNvPr id="7" name="Picture 6">
+            <a:extLst>
+              <a:ext uri="{FF2B5EF4-FFF2-40B4-BE49-F238E27FC236}">
+                <a16:creationId xmlns:a16="http://schemas.microsoft.com/office/drawing/2014/main" id="{C853B490-EB77-E487-B100-6B9661BD46B9}"/>
+              </a:ext>
+            </a:extLst>
+          </p:cNvPr>
+          <p:cNvPicPr>
+            <a:picLocks noChangeAspect="1"/>
+          </p:cNvPicPr>
+          <p:nvPr/>
+        </p:nvPicPr>
+        <p:blipFill>
+          <a:blip r:embed="rId3"/>
+          <a:stretch>
+            <a:fillRect/>
+          </a:stretch>
+        </p:blipFill>
+        <p:spPr>
+          <a:xfrm>
+            <a:off x="11023629" y="0"/>
+            <a:ext cx="1168371" cy="1119544"/>
+          </a:xfrm>
+          <a:prstGeom prst="rect">
+            <a:avLst/>
+          </a:prstGeom>
+        </p:spPr>
+      </p:pic>
     </p:spTree>
     <p:extLst>
       <p:ext uri="{BB962C8B-B14F-4D97-AF65-F5344CB8AC3E}">
@@ -14913,6 +15250,36 @@
             <a:ext cx="7899991" cy="5055994"/>
           </a:xfrm>
           <a:noFill/>
+        </p:spPr>
+      </p:pic>
+      <p:pic>
+        <p:nvPicPr>
+          <p:cNvPr id="4" name="Picture 3">
+            <a:extLst>
+              <a:ext uri="{FF2B5EF4-FFF2-40B4-BE49-F238E27FC236}">
+                <a16:creationId xmlns:a16="http://schemas.microsoft.com/office/drawing/2014/main" id="{9F6A1422-A8C0-F931-10EF-03D6C9C8AE25}"/>
+              </a:ext>
+            </a:extLst>
+          </p:cNvPr>
+          <p:cNvPicPr>
+            <a:picLocks noChangeAspect="1"/>
+          </p:cNvPicPr>
+          <p:nvPr/>
+        </p:nvPicPr>
+        <p:blipFill>
+          <a:blip r:embed="rId3"/>
+          <a:stretch>
+            <a:fillRect/>
+          </a:stretch>
+        </p:blipFill>
+        <p:spPr>
+          <a:xfrm>
+            <a:off x="11023629" y="0"/>
+            <a:ext cx="1168371" cy="1119544"/>
+          </a:xfrm>
+          <a:prstGeom prst="rect">
+            <a:avLst/>
+          </a:prstGeom>
         </p:spPr>
       </p:pic>
     </p:spTree>
@@ -15063,6 +15430,36 @@
           </a:xfrm>
         </p:spPr>
       </p:pic>
+      <p:pic>
+        <p:nvPicPr>
+          <p:cNvPr id="3" name="Picture 2">
+            <a:extLst>
+              <a:ext uri="{FF2B5EF4-FFF2-40B4-BE49-F238E27FC236}">
+                <a16:creationId xmlns:a16="http://schemas.microsoft.com/office/drawing/2014/main" id="{F324C7D4-3148-CFCB-D6DF-F85A3FC1382D}"/>
+              </a:ext>
+            </a:extLst>
+          </p:cNvPr>
+          <p:cNvPicPr>
+            <a:picLocks noChangeAspect="1"/>
+          </p:cNvPicPr>
+          <p:nvPr/>
+        </p:nvPicPr>
+        <p:blipFill>
+          <a:blip r:embed="rId3"/>
+          <a:stretch>
+            <a:fillRect/>
+          </a:stretch>
+        </p:blipFill>
+        <p:spPr>
+          <a:xfrm>
+            <a:off x="10149790" y="0"/>
+            <a:ext cx="2042210" cy="1083733"/>
+          </a:xfrm>
+          <a:prstGeom prst="rect">
+            <a:avLst/>
+          </a:prstGeom>
+        </p:spPr>
+      </p:pic>
     </p:spTree>
     <p:extLst>
       <p:ext uri="{BB962C8B-B14F-4D97-AF65-F5344CB8AC3E}">
@@ -15263,6 +15660,36 @@
           </a:p>
         </p:txBody>
       </p:sp>
+      <p:pic>
+        <p:nvPicPr>
+          <p:cNvPr id="7" name="Picture 6">
+            <a:extLst>
+              <a:ext uri="{FF2B5EF4-FFF2-40B4-BE49-F238E27FC236}">
+                <a16:creationId xmlns:a16="http://schemas.microsoft.com/office/drawing/2014/main" id="{C97C7AD8-47A1-1CC7-34A8-D440132227B3}"/>
+              </a:ext>
+            </a:extLst>
+          </p:cNvPr>
+          <p:cNvPicPr>
+            <a:picLocks noChangeAspect="1"/>
+          </p:cNvPicPr>
+          <p:nvPr/>
+        </p:nvPicPr>
+        <p:blipFill>
+          <a:blip r:embed="rId2"/>
+          <a:stretch>
+            <a:fillRect/>
+          </a:stretch>
+        </p:blipFill>
+        <p:spPr>
+          <a:xfrm>
+            <a:off x="11023629" y="0"/>
+            <a:ext cx="1168371" cy="1119544"/>
+          </a:xfrm>
+          <a:prstGeom prst="rect">
+            <a:avLst/>
+          </a:prstGeom>
+        </p:spPr>
+      </p:pic>
     </p:spTree>
     <p:extLst>
       <p:ext uri="{BB962C8B-B14F-4D97-AF65-F5344CB8AC3E}">
@@ -15360,6 +15787,36 @@
           </a:graphicData>
         </a:graphic>
       </p:graphicFrame>
+      <p:pic>
+        <p:nvPicPr>
+          <p:cNvPr id="5" name="Picture 4">
+            <a:extLst>
+              <a:ext uri="{FF2B5EF4-FFF2-40B4-BE49-F238E27FC236}">
+                <a16:creationId xmlns:a16="http://schemas.microsoft.com/office/drawing/2014/main" id="{5E4B2CB4-72DD-ECB7-409E-45D8E996ECD4}"/>
+              </a:ext>
+            </a:extLst>
+          </p:cNvPr>
+          <p:cNvPicPr>
+            <a:picLocks noChangeAspect="1"/>
+          </p:cNvPicPr>
+          <p:nvPr/>
+        </p:nvPicPr>
+        <p:blipFill>
+          <a:blip r:embed="rId7"/>
+          <a:stretch>
+            <a:fillRect/>
+          </a:stretch>
+        </p:blipFill>
+        <p:spPr>
+          <a:xfrm>
+            <a:off x="11023629" y="0"/>
+            <a:ext cx="1168371" cy="1119544"/>
+          </a:xfrm>
+          <a:prstGeom prst="rect">
+            <a:avLst/>
+          </a:prstGeom>
+        </p:spPr>
+      </p:pic>
     </p:spTree>
     <p:extLst>
       <p:ext uri="{BB962C8B-B14F-4D97-AF65-F5344CB8AC3E}">
@@ -15505,7 +15962,7 @@
           <a:p>
             <a:r>
               <a:rPr lang="nl-BE" sz="2400" dirty="0" err="1"/>
-              <a:t>Agrre</a:t>
+              <a:t>Agree</a:t>
             </a:r>
             <a:r>
               <a:rPr lang="nl-BE" sz="2400" dirty="0"/>
@@ -15708,8 +16165,38 @@
         </p:blipFill>
         <p:spPr>
           <a:xfrm>
-            <a:off x="6511668" y="791254"/>
-            <a:ext cx="4348381" cy="2901820"/>
+            <a:off x="6511669" y="1265234"/>
+            <a:ext cx="3638122" cy="2427840"/>
+          </a:xfrm>
+          <a:prstGeom prst="rect">
+            <a:avLst/>
+          </a:prstGeom>
+        </p:spPr>
+      </p:pic>
+      <p:pic>
+        <p:nvPicPr>
+          <p:cNvPr id="7" name="Picture 6">
+            <a:extLst>
+              <a:ext uri="{FF2B5EF4-FFF2-40B4-BE49-F238E27FC236}">
+                <a16:creationId xmlns:a16="http://schemas.microsoft.com/office/drawing/2014/main" id="{47E2B5A2-32AA-B23C-D66D-63173A95AF56}"/>
+              </a:ext>
+            </a:extLst>
+          </p:cNvPr>
+          <p:cNvPicPr>
+            <a:picLocks noChangeAspect="1"/>
+          </p:cNvPicPr>
+          <p:nvPr/>
+        </p:nvPicPr>
+        <p:blipFill>
+          <a:blip r:embed="rId3"/>
+          <a:stretch>
+            <a:fillRect/>
+          </a:stretch>
+        </p:blipFill>
+        <p:spPr>
+          <a:xfrm>
+            <a:off x="11023629" y="0"/>
+            <a:ext cx="1168371" cy="1119544"/>
           </a:xfrm>
           <a:prstGeom prst="rect">
             <a:avLst/>
@@ -15968,6 +16455,36 @@
           </a:p>
         </p:txBody>
       </p:sp>
+      <p:pic>
+        <p:nvPicPr>
+          <p:cNvPr id="6" name="Picture 5">
+            <a:extLst>
+              <a:ext uri="{FF2B5EF4-FFF2-40B4-BE49-F238E27FC236}">
+                <a16:creationId xmlns:a16="http://schemas.microsoft.com/office/drawing/2014/main" id="{11AA81B8-C305-26D4-B264-BF17F9BC5C6F}"/>
+              </a:ext>
+            </a:extLst>
+          </p:cNvPr>
+          <p:cNvPicPr>
+            <a:picLocks noChangeAspect="1"/>
+          </p:cNvPicPr>
+          <p:nvPr/>
+        </p:nvPicPr>
+        <p:blipFill>
+          <a:blip r:embed="rId4"/>
+          <a:stretch>
+            <a:fillRect/>
+          </a:stretch>
+        </p:blipFill>
+        <p:spPr>
+          <a:xfrm>
+            <a:off x="11023629" y="0"/>
+            <a:ext cx="1168371" cy="1119544"/>
+          </a:xfrm>
+          <a:prstGeom prst="rect">
+            <a:avLst/>
+          </a:prstGeom>
+        </p:spPr>
+      </p:pic>
     </p:spTree>
     <p:extLst>
       <p:ext uri="{BB962C8B-B14F-4D97-AF65-F5344CB8AC3E}">
@@ -16170,6 +16687,36 @@
             <a:avLst/>
           </a:prstGeom>
           <a:noFill/>
+        </p:spPr>
+      </p:pic>
+      <p:pic>
+        <p:nvPicPr>
+          <p:cNvPr id="5" name="Picture 4">
+            <a:extLst>
+              <a:ext uri="{FF2B5EF4-FFF2-40B4-BE49-F238E27FC236}">
+                <a16:creationId xmlns:a16="http://schemas.microsoft.com/office/drawing/2014/main" id="{382A70AB-5C8E-EF1A-FDD0-99E9C0CBC829}"/>
+              </a:ext>
+            </a:extLst>
+          </p:cNvPr>
+          <p:cNvPicPr>
+            <a:picLocks noChangeAspect="1"/>
+          </p:cNvPicPr>
+          <p:nvPr/>
+        </p:nvPicPr>
+        <p:blipFill>
+          <a:blip r:embed="rId3"/>
+          <a:stretch>
+            <a:fillRect/>
+          </a:stretch>
+        </p:blipFill>
+        <p:spPr>
+          <a:xfrm>
+            <a:off x="11023629" y="0"/>
+            <a:ext cx="1168371" cy="1119544"/>
+          </a:xfrm>
+          <a:prstGeom prst="rect">
+            <a:avLst/>
+          </a:prstGeom>
         </p:spPr>
       </p:pic>
     </p:spTree>
@@ -16424,6 +16971,36 @@
           </a:p>
         </p:txBody>
       </p:sp>
+      <p:pic>
+        <p:nvPicPr>
+          <p:cNvPr id="5" name="Picture 4">
+            <a:extLst>
+              <a:ext uri="{FF2B5EF4-FFF2-40B4-BE49-F238E27FC236}">
+                <a16:creationId xmlns:a16="http://schemas.microsoft.com/office/drawing/2014/main" id="{E6EED494-061B-D239-7940-CB0E92996F31}"/>
+              </a:ext>
+            </a:extLst>
+          </p:cNvPr>
+          <p:cNvPicPr>
+            <a:picLocks noChangeAspect="1"/>
+          </p:cNvPicPr>
+          <p:nvPr/>
+        </p:nvPicPr>
+        <p:blipFill>
+          <a:blip r:embed="rId2"/>
+          <a:stretch>
+            <a:fillRect/>
+          </a:stretch>
+        </p:blipFill>
+        <p:spPr>
+          <a:xfrm>
+            <a:off x="11023629" y="0"/>
+            <a:ext cx="1168371" cy="1119544"/>
+          </a:xfrm>
+          <a:prstGeom prst="rect">
+            <a:avLst/>
+          </a:prstGeom>
+        </p:spPr>
+      </p:pic>
     </p:spTree>
     <p:extLst>
       <p:ext uri="{BB962C8B-B14F-4D97-AF65-F5344CB8AC3E}">
@@ -16512,6 +17089,66 @@
           </a:p>
         </p:txBody>
       </p:sp>
+      <p:pic>
+        <p:nvPicPr>
+          <p:cNvPr id="3" name="Picture 2">
+            <a:extLst>
+              <a:ext uri="{FF2B5EF4-FFF2-40B4-BE49-F238E27FC236}">
+                <a16:creationId xmlns:a16="http://schemas.microsoft.com/office/drawing/2014/main" id="{F5650E4A-A455-044E-A804-EA64326CFE1A}"/>
+              </a:ext>
+            </a:extLst>
+          </p:cNvPr>
+          <p:cNvPicPr>
+            <a:picLocks noChangeAspect="1"/>
+          </p:cNvPicPr>
+          <p:nvPr/>
+        </p:nvPicPr>
+        <p:blipFill>
+          <a:blip r:embed="rId2"/>
+          <a:stretch>
+            <a:fillRect/>
+          </a:stretch>
+        </p:blipFill>
+        <p:spPr>
+          <a:xfrm>
+            <a:off x="0" y="0"/>
+            <a:ext cx="3572374" cy="1895740"/>
+          </a:xfrm>
+          <a:prstGeom prst="rect">
+            <a:avLst/>
+          </a:prstGeom>
+        </p:spPr>
+      </p:pic>
+      <p:pic>
+        <p:nvPicPr>
+          <p:cNvPr id="5" name="Picture 4">
+            <a:extLst>
+              <a:ext uri="{FF2B5EF4-FFF2-40B4-BE49-F238E27FC236}">
+                <a16:creationId xmlns:a16="http://schemas.microsoft.com/office/drawing/2014/main" id="{B4138F83-95DD-551E-11E7-F22CD205110E}"/>
+              </a:ext>
+            </a:extLst>
+          </p:cNvPr>
+          <p:cNvPicPr>
+            <a:picLocks noChangeAspect="1"/>
+          </p:cNvPicPr>
+          <p:nvPr/>
+        </p:nvPicPr>
+        <p:blipFill>
+          <a:blip r:embed="rId3"/>
+          <a:stretch>
+            <a:fillRect/>
+          </a:stretch>
+        </p:blipFill>
+        <p:spPr>
+          <a:xfrm>
+            <a:off x="9591312" y="0"/>
+            <a:ext cx="2600688" cy="1038370"/>
+          </a:xfrm>
+          <a:prstGeom prst="rect">
+            <a:avLst/>
+          </a:prstGeom>
+        </p:spPr>
+      </p:pic>
     </p:spTree>
     <p:extLst>
       <p:ext uri="{BB962C8B-B14F-4D97-AF65-F5344CB8AC3E}">
@@ -16738,6 +17375,36 @@
           <a:xfrm>
             <a:off x="2429487" y="2511989"/>
             <a:ext cx="8647269" cy="3555436"/>
+          </a:xfrm>
+          <a:prstGeom prst="rect">
+            <a:avLst/>
+          </a:prstGeom>
+        </p:spPr>
+      </p:pic>
+      <p:pic>
+        <p:nvPicPr>
+          <p:cNvPr id="7" name="Picture 6">
+            <a:extLst>
+              <a:ext uri="{FF2B5EF4-FFF2-40B4-BE49-F238E27FC236}">
+                <a16:creationId xmlns:a16="http://schemas.microsoft.com/office/drawing/2014/main" id="{AF721B13-6745-9D91-A98B-04115A811ED5}"/>
+              </a:ext>
+            </a:extLst>
+          </p:cNvPr>
+          <p:cNvPicPr>
+            <a:picLocks noChangeAspect="1"/>
+          </p:cNvPicPr>
+          <p:nvPr/>
+        </p:nvPicPr>
+        <p:blipFill>
+          <a:blip r:embed="rId4"/>
+          <a:stretch>
+            <a:fillRect/>
+          </a:stretch>
+        </p:blipFill>
+        <p:spPr>
+          <a:xfrm>
+            <a:off x="11023629" y="0"/>
+            <a:ext cx="1168371" cy="1119544"/>
           </a:xfrm>
           <a:prstGeom prst="rect">
             <a:avLst/>
@@ -17969,16 +18636,16 @@
 <file path=customXml/itemProps3.xml><?xml version="1.0" encoding="utf-8"?>
 <ds:datastoreItem xmlns:ds="http://schemas.openxmlformats.org/officeDocument/2006/customXml" ds:itemID="{C3230FCF-7E2C-49A6-9845-CBD6D2D1FEFD}">
   <ds:schemaRefs>
+    <ds:schemaRef ds:uri="http://purl.org/dc/elements/1.1/"/>
+    <ds:schemaRef ds:uri="http://schemas.microsoft.com/office/2006/metadata/properties"/>
+    <ds:schemaRef ds:uri="http://purl.org/dc/terms/"/>
     <ds:schemaRef ds:uri="0cc6be1f-1d06-4615-804e-626feaab1672"/>
+    <ds:schemaRef ds:uri="http://schemas.microsoft.com/office/infopath/2007/PartnerControls"/>
+    <ds:schemaRef ds:uri="http://schemas.microsoft.com/office/2006/documentManagement/types"/>
+    <ds:schemaRef ds:uri="http://schemas.openxmlformats.org/package/2006/metadata/core-properties"/>
     <ds:schemaRef ds:uri="7b44348b-fe42-4538-8747-b176ebb91125"/>
+    <ds:schemaRef ds:uri="http://www.w3.org/XML/1998/namespace"/>
     <ds:schemaRef ds:uri="http://purl.org/dc/dcmitype/"/>
-    <ds:schemaRef ds:uri="http://purl.org/dc/elements/1.1/"/>
-    <ds:schemaRef ds:uri="http://purl.org/dc/terms/"/>
-    <ds:schemaRef ds:uri="http://schemas.microsoft.com/office/2006/documentManagement/types"/>
-    <ds:schemaRef ds:uri="http://schemas.microsoft.com/office/2006/metadata/properties"/>
-    <ds:schemaRef ds:uri="http://schemas.microsoft.com/office/infopath/2007/PartnerControls"/>
-    <ds:schemaRef ds:uri="http://schemas.openxmlformats.org/package/2006/metadata/core-properties"/>
-    <ds:schemaRef ds:uri="http://www.w3.org/XML/1998/namespace"/>
   </ds:schemaRefs>
 </ds:datastoreItem>
 </file>
</xml_diff>

<commit_message>
Update slide 7 "Service public de Wallonie – SPW Digital"
As requested by BUFFET Dominique <dominique.buffet@spw.wallonie.be> on 2024-06-25.
</commit_message>
<xml_diff>
--- a/Meetings/2024-06-12/20240627-ICEG voor SEMIC.pptx
+++ b/Meetings/2024-06-12/20240627-ICEG voor SEMIC.pptx
@@ -164,8 +164,8 @@
 <pc:chgInfo xmlns:a="http://schemas.openxmlformats.org/drawingml/2006/main" xmlns:r="http://schemas.openxmlformats.org/officeDocument/2006/relationships" xmlns:ac="http://schemas.microsoft.com/office/drawing/2013/main/command" xmlns:pc="http://schemas.microsoft.com/office/powerpoint/2013/main/command">
   <pc:docChgLst>
     <pc:chgData name="Marc Bruyland (BOSA)" userId="30f554ab-b4b0-445e-a2ab-9dd766d4dafd" providerId="ADAL" clId="{19946E19-6A71-41FF-BE86-9B534CEBBFC3}"/>
-    <pc:docChg chg="custSel modSld">
-      <pc:chgData name="Marc Bruyland (BOSA)" userId="30f554ab-b4b0-445e-a2ab-9dd766d4dafd" providerId="ADAL" clId="{19946E19-6A71-41FF-BE86-9B534CEBBFC3}" dt="2024-06-12T09:29:37.245" v="56"/>
+    <pc:docChg chg="undo custSel modSld">
+      <pc:chgData name="Marc Bruyland (BOSA)" userId="30f554ab-b4b0-445e-a2ab-9dd766d4dafd" providerId="ADAL" clId="{19946E19-6A71-41FF-BE86-9B534CEBBFC3}" dt="2024-06-25T13:09:45.175" v="62" actId="108"/>
       <pc:docMkLst>
         <pc:docMk/>
       </pc:docMkLst>
@@ -332,11 +332,19 @@
         </pc:picChg>
       </pc:sldChg>
       <pc:sldChg chg="addSp delSp modSp mod">
-        <pc:chgData name="Marc Bruyland (BOSA)" userId="30f554ab-b4b0-445e-a2ab-9dd766d4dafd" providerId="ADAL" clId="{19946E19-6A71-41FF-BE86-9B534CEBBFC3}" dt="2024-06-12T09:29:19.918" v="50"/>
+        <pc:chgData name="Marc Bruyland (BOSA)" userId="30f554ab-b4b0-445e-a2ab-9dd766d4dafd" providerId="ADAL" clId="{19946E19-6A71-41FF-BE86-9B534CEBBFC3}" dt="2024-06-25T13:09:45.175" v="62" actId="108"/>
         <pc:sldMkLst>
           <pc:docMk/>
           <pc:sldMk cId="2946174427" sldId="265"/>
         </pc:sldMkLst>
+        <pc:spChg chg="mod">
+          <ac:chgData name="Marc Bruyland (BOSA)" userId="30f554ab-b4b0-445e-a2ab-9dd766d4dafd" providerId="ADAL" clId="{19946E19-6A71-41FF-BE86-9B534CEBBFC3}" dt="2024-06-25T13:09:45.175" v="62" actId="108"/>
+          <ac:spMkLst>
+            <pc:docMk/>
+            <pc:sldMk cId="2946174427" sldId="265"/>
+            <ac:spMk id="3" creationId="{BBEE2B05-E887-45D4-ACC3-C6C45222A4F7}"/>
+          </ac:spMkLst>
+        </pc:spChg>
         <pc:picChg chg="add del mod">
           <ac:chgData name="Marc Bruyland (BOSA)" userId="30f554ab-b4b0-445e-a2ab-9dd766d4dafd" providerId="ADAL" clId="{19946E19-6A71-41FF-BE86-9B534CEBBFC3}" dt="2024-06-12T09:29:19.294" v="49" actId="478"/>
           <ac:picMkLst>
@@ -4651,7 +4659,7 @@
           <a:p>
             <a:fld id="{10725DA4-A8DC-453E-A5F7-88F0AE5319D4}" type="datetimeFigureOut">
               <a:rPr lang="nl-BE" smtClean="0"/>
-              <a:t>12/06/2024</a:t>
+              <a:t>25/06/2024</a:t>
             </a:fld>
             <a:endParaRPr lang="nl-BE"/>
           </a:p>
@@ -4828,7 +4836,7 @@
           <a:p>
             <a:fld id="{D9A92508-5353-4BD4-B9CC-1DB34B125BDB}" type="datetimeFigureOut">
               <a:rPr lang="nl-BE" smtClean="0"/>
-              <a:t>12/06/2024</a:t>
+              <a:t>25/06/2024</a:t>
             </a:fld>
             <a:endParaRPr lang="nl-BE"/>
           </a:p>
@@ -11635,7 +11643,7 @@
             <a:fld id="{AE753531-74F9-46DB-8226-2C37E7D3FBBB}" type="datetime3">
               <a:rPr lang="nl-BE" smtClean="0"/>
               <a:pPr/>
-              <a:t>12.06.24</a:t>
+              <a:t>25.06.24</a:t>
             </a:fld>
             <a:endParaRPr lang="nl-BE"/>
           </a:p>
@@ -12352,7 +12360,7 @@
                 <a:tabLst/>
                 <a:defRPr/>
               </a:pPr>
-              <a:t>12.06.24</a:t>
+              <a:t>25.06.24</a:t>
             </a:fld>
             <a:endParaRPr kumimoji="0" lang="nl-BE" sz="1050" b="0" i="0" u="none" strike="noStrike" kern="1200" cap="none" spc="0" normalizeH="0" baseline="0" noProof="0">
               <a:ln>
@@ -16873,35 +16881,16 @@
             </a:r>
           </a:p>
           <a:p>
-            <a:pPr lvl="1"/>
-            <a:r>
-              <a:rPr lang="nl-BE" sz="2100" dirty="0"/>
-              <a:t>e-</a:t>
-            </a:r>
-            <a:r>
-              <a:rPr lang="nl-BE" sz="2100" dirty="0" err="1"/>
-              <a:t>Wallonie</a:t>
-            </a:r>
-            <a:r>
-              <a:rPr lang="nl-BE" sz="2100" dirty="0"/>
-              <a:t> Bruxelles </a:t>
-            </a:r>
-            <a:r>
-              <a:rPr lang="nl-BE" sz="2100" dirty="0" err="1"/>
-              <a:t>Simplification</a:t>
-            </a:r>
-            <a:r>
-              <a:rPr lang="nl-BE" sz="2100" dirty="0"/>
-              <a:t> (</a:t>
-            </a:r>
-            <a:r>
-              <a:rPr lang="nl-BE" sz="2100" dirty="0" err="1"/>
-              <a:t>eWBS</a:t>
-            </a:r>
-            <a:r>
-              <a:rPr lang="nl-BE" sz="2100" dirty="0"/>
-              <a:t>)</a:t>
-            </a:r>
+            <a:pPr lvl="1">
+              <a:lnSpc>
+                <a:spcPct val="100000"/>
+              </a:lnSpc>
+            </a:pPr>
+            <a:r>
+              <a:rPr lang="fr-BE" sz="2100" dirty="0"/>
+              <a:t>Service public de Wallonie – SPW Digital </a:t>
+            </a:r>
+            <a:endParaRPr lang="nl-BE" sz="2100" dirty="0"/>
           </a:p>
           <a:p>
             <a:pPr lvl="1"/>
@@ -18363,15 +18352,6 @@
 </file>
 
 <file path=customXml/item1.xml><?xml version="1.0" encoding="utf-8"?>
-<?mso-contentType ?>
-<FormTemplates xmlns="http://schemas.microsoft.com/sharepoint/v3/contenttype/forms">
-  <Display>DocumentLibraryForm</Display>
-  <Edit>DocumentLibraryForm</Edit>
-  <New>DocumentLibraryForm</New>
-</FormTemplates>
-</file>
-
-<file path=customXml/item2.xml><?xml version="1.0" encoding="utf-8"?>
 <ct:contentTypeSchema xmlns:ct="http://schemas.microsoft.com/office/2006/metadata/contentType" xmlns:ma="http://schemas.microsoft.com/office/2006/metadata/properties/metaAttributes" ct:_="" ma:_="" ma:contentTypeName="Document" ma:contentTypeID="0x0101007EE9AB0C6E1C484382D40F2169663E66" ma:contentTypeVersion="14" ma:contentTypeDescription="Create a new document." ma:contentTypeScope="" ma:versionID="48da21d7498a6aa1332cadbe711d2270">
   <xsd:schema xmlns:xsd="http://www.w3.org/2001/XMLSchema" xmlns:xs="http://www.w3.org/2001/XMLSchema" xmlns:p="http://schemas.microsoft.com/office/2006/metadata/properties" xmlns:ns3="7b44348b-fe42-4538-8747-b176ebb91125" xmlns:ns4="0cc6be1f-1d06-4615-804e-626feaab1672" targetNamespace="http://schemas.microsoft.com/office/2006/metadata/properties" ma:root="true" ma:fieldsID="c2625b64546336ed264fbc534467d53f" ns3:_="" ns4:_="">
     <xsd:import namespace="7b44348b-fe42-4538-8747-b176ebb91125"/>
@@ -18600,6 +18580,15 @@
 </ct:contentTypeSchema>
 </file>
 
+<file path=customXml/item2.xml><?xml version="1.0" encoding="utf-8"?>
+<?mso-contentType ?>
+<FormTemplates xmlns="http://schemas.microsoft.com/sharepoint/v3/contenttype/forms">
+  <Display>DocumentLibraryForm</Display>
+  <Edit>DocumentLibraryForm</Edit>
+  <New>DocumentLibraryForm</New>
+</FormTemplates>
+</file>
+
 <file path=customXml/item3.xml><?xml version="1.0" encoding="utf-8"?>
 <p:properties xmlns:p="http://schemas.microsoft.com/office/2006/metadata/properties" xmlns:xsi="http://www.w3.org/2001/XMLSchema-instance" xmlns:pc="http://schemas.microsoft.com/office/infopath/2007/PartnerControls">
   <documentManagement/>
@@ -18607,14 +18596,6 @@
 </file>
 
 <file path=customXml/itemProps1.xml><?xml version="1.0" encoding="utf-8"?>
-<ds:datastoreItem xmlns:ds="http://schemas.openxmlformats.org/officeDocument/2006/customXml" ds:itemID="{6E9A69DA-972F-4782-9556-0955EB85B101}">
-  <ds:schemaRefs>
-    <ds:schemaRef ds:uri="http://schemas.microsoft.com/sharepoint/v3/contenttype/forms"/>
-  </ds:schemaRefs>
-</ds:datastoreItem>
-</file>
-
-<file path=customXml/itemProps2.xml><?xml version="1.0" encoding="utf-8"?>
 <ds:datastoreItem xmlns:ds="http://schemas.openxmlformats.org/officeDocument/2006/customXml" ds:itemID="{E96C3795-7C56-4F4D-948B-80D3A32FA1C8}">
   <ds:schemaRefs>
     <ds:schemaRef ds:uri="0cc6be1f-1d06-4615-804e-626feaab1672"/>
@@ -18629,6 +18610,14 @@
     <ds:schemaRef ds:uri="http://schemas.microsoft.com/office/infopath/2007/PartnerControls"/>
     <ds:schemaRef ds:uri="http://schemas.openxmlformats.org/package/2006/metadata/core-properties"/>
     <ds:schemaRef ds:uri="http://www.w3.org/2001/XMLSchema"/>
+  </ds:schemaRefs>
+</ds:datastoreItem>
+</file>
+
+<file path=customXml/itemProps2.xml><?xml version="1.0" encoding="utf-8"?>
+<ds:datastoreItem xmlns:ds="http://schemas.openxmlformats.org/officeDocument/2006/customXml" ds:itemID="{6E9A69DA-972F-4782-9556-0955EB85B101}">
+  <ds:schemaRefs>
+    <ds:schemaRef ds:uri="http://schemas.microsoft.com/sharepoint/v3/contenttype/forms"/>
   </ds:schemaRefs>
 </ds:datastoreItem>
 </file>

</xml_diff>